<commit_message>
Updated slides and notebook
</commit_message>
<xml_diff>
--- a/Midterm_Presentation.pptx
+++ b/Midterm_Presentation.pptx
@@ -9150,7 +9150,7 @@
         </p:blipFill>
         <p:spPr>
           <a:xfrm>
-            <a:off x="7474486" y="2148113"/>
+            <a:off x="7412702" y="2296394"/>
             <a:ext cx="4341956" cy="2905125"/>
           </a:xfrm>
           <a:prstGeom prst="rect">
@@ -9322,6 +9322,36 @@
           </a:p>
         </p:txBody>
       </p:sp>
+      <p:pic>
+        <p:nvPicPr>
+          <p:cNvPr id="7" name="図 6">
+            <a:extLst>
+              <a:ext uri="{FF2B5EF4-FFF2-40B4-BE49-F238E27FC236}">
+                <a16:creationId xmlns:a16="http://schemas.microsoft.com/office/drawing/2014/main" id="{3E4DB593-9957-486E-D25B-F70507D2DC18}"/>
+              </a:ext>
+            </a:extLst>
+          </p:cNvPr>
+          <p:cNvPicPr>
+            <a:picLocks noChangeAspect="1"/>
+          </p:cNvPicPr>
+          <p:nvPr/>
+        </p:nvPicPr>
+        <p:blipFill>
+          <a:blip r:embed="rId2"/>
+          <a:stretch>
+            <a:fillRect/>
+          </a:stretch>
+        </p:blipFill>
+        <p:spPr>
+          <a:xfrm>
+            <a:off x="4024086" y="4632427"/>
+            <a:ext cx="7772400" cy="1991077"/>
+          </a:xfrm>
+          <a:prstGeom prst="rect">
+            <a:avLst/>
+          </a:prstGeom>
+        </p:spPr>
+      </p:pic>
     </p:spTree>
     <p:extLst>
       <p:ext uri="{BB962C8B-B14F-4D97-AF65-F5344CB8AC3E}">

</xml_diff>